<commit_message>
Add initial project portfolio
</commit_message>
<xml_diff>
--- a/docs/diagrams/CommonsComponentExceptionClassDiagram.pptx
+++ b/docs/diagrams/CommonsComponentExceptionClassDiagram.pptx
@@ -212,7 +212,7 @@
           <a:p>
             <a:fld id="{F5CC4B3F-88C1-4FFA-B1B6-F41C21DC6924}" type="datetimeFigureOut">
               <a:rPr lang="en-US" smtClean="0"/>
-              <a:t>11/7/17</a:t>
+              <a:t>11/8/17</a:t>
             </a:fld>
             <a:endParaRPr lang="en-US"/>
           </a:p>
@@ -658,7 +658,7 @@
           <a:p>
             <a:fld id="{78C97017-6FC3-485B-9764-EAC9E56C1D49}" type="datetimeFigureOut">
               <a:rPr lang="en-US" smtClean="0"/>
-              <a:t>11/7/17</a:t>
+              <a:t>11/8/17</a:t>
             </a:fld>
             <a:endParaRPr lang="en-US"/>
           </a:p>
@@ -826,7 +826,7 @@
           <a:p>
             <a:fld id="{78C97017-6FC3-485B-9764-EAC9E56C1D49}" type="datetimeFigureOut">
               <a:rPr lang="en-US" smtClean="0"/>
-              <a:t>11/7/17</a:t>
+              <a:t>11/8/17</a:t>
             </a:fld>
             <a:endParaRPr lang="en-US"/>
           </a:p>
@@ -1004,7 +1004,7 @@
           <a:p>
             <a:fld id="{78C97017-6FC3-485B-9764-EAC9E56C1D49}" type="datetimeFigureOut">
               <a:rPr lang="en-US" smtClean="0"/>
-              <a:t>11/7/17</a:t>
+              <a:t>11/8/17</a:t>
             </a:fld>
             <a:endParaRPr lang="en-US"/>
           </a:p>
@@ -1172,7 +1172,7 @@
           <a:p>
             <a:fld id="{78C97017-6FC3-485B-9764-EAC9E56C1D49}" type="datetimeFigureOut">
               <a:rPr lang="en-US" smtClean="0"/>
-              <a:t>11/7/17</a:t>
+              <a:t>11/8/17</a:t>
             </a:fld>
             <a:endParaRPr lang="en-US"/>
           </a:p>
@@ -1417,7 +1417,7 @@
           <a:p>
             <a:fld id="{78C97017-6FC3-485B-9764-EAC9E56C1D49}" type="datetimeFigureOut">
               <a:rPr lang="en-US" smtClean="0"/>
-              <a:t>11/7/17</a:t>
+              <a:t>11/8/17</a:t>
             </a:fld>
             <a:endParaRPr lang="en-US"/>
           </a:p>
@@ -1702,7 +1702,7 @@
           <a:p>
             <a:fld id="{78C97017-6FC3-485B-9764-EAC9E56C1D49}" type="datetimeFigureOut">
               <a:rPr lang="en-US" smtClean="0"/>
-              <a:t>11/7/17</a:t>
+              <a:t>11/8/17</a:t>
             </a:fld>
             <a:endParaRPr lang="en-US"/>
           </a:p>
@@ -2121,7 +2121,7 @@
           <a:p>
             <a:fld id="{78C97017-6FC3-485B-9764-EAC9E56C1D49}" type="datetimeFigureOut">
               <a:rPr lang="en-US" smtClean="0"/>
-              <a:t>11/7/17</a:t>
+              <a:t>11/8/17</a:t>
             </a:fld>
             <a:endParaRPr lang="en-US"/>
           </a:p>
@@ -2238,7 +2238,7 @@
           <a:p>
             <a:fld id="{78C97017-6FC3-485B-9764-EAC9E56C1D49}" type="datetimeFigureOut">
               <a:rPr lang="en-US" smtClean="0"/>
-              <a:t>11/7/17</a:t>
+              <a:t>11/8/17</a:t>
             </a:fld>
             <a:endParaRPr lang="en-US"/>
           </a:p>
@@ -2333,7 +2333,7 @@
           <a:p>
             <a:fld id="{78C97017-6FC3-485B-9764-EAC9E56C1D49}" type="datetimeFigureOut">
               <a:rPr lang="en-US" smtClean="0"/>
-              <a:t>11/7/17</a:t>
+              <a:t>11/8/17</a:t>
             </a:fld>
             <a:endParaRPr lang="en-US"/>
           </a:p>
@@ -2608,7 +2608,7 @@
           <a:p>
             <a:fld id="{78C97017-6FC3-485B-9764-EAC9E56C1D49}" type="datetimeFigureOut">
               <a:rPr lang="en-US" smtClean="0"/>
-              <a:t>11/7/17</a:t>
+              <a:t>11/8/17</a:t>
             </a:fld>
             <a:endParaRPr lang="en-US"/>
           </a:p>
@@ -2860,7 +2860,7 @@
           <a:p>
             <a:fld id="{78C97017-6FC3-485B-9764-EAC9E56C1D49}" type="datetimeFigureOut">
               <a:rPr lang="en-US" smtClean="0"/>
-              <a:t>11/7/17</a:t>
+              <a:t>11/8/17</a:t>
             </a:fld>
             <a:endParaRPr lang="en-US"/>
           </a:p>
@@ -3071,7 +3071,7 @@
           <a:p>
             <a:fld id="{78C97017-6FC3-485B-9764-EAC9E56C1D49}" type="datetimeFigureOut">
               <a:rPr lang="en-US" smtClean="0"/>
-              <a:t>11/7/17</a:t>
+              <a:t>11/8/17</a:t>
             </a:fld>
             <a:endParaRPr lang="en-US"/>
           </a:p>
@@ -3454,7 +3454,7 @@
         </p:nvSpPr>
         <p:spPr>
           <a:xfrm>
-            <a:off x="3772930" y="1540476"/>
+            <a:off x="3772930" y="2895600"/>
             <a:ext cx="1688269" cy="422960"/>
           </a:xfrm>
           <a:prstGeom prst="rect">
@@ -3513,7 +3513,7 @@
         </p:nvCxnSpPr>
         <p:spPr>
           <a:xfrm rot="16200000" flipV="1">
-            <a:off x="5701065" y="1628680"/>
+            <a:off x="5701065" y="2983804"/>
             <a:ext cx="573970" cy="2742465"/>
           </a:xfrm>
           <a:prstGeom prst="bentConnector2">
@@ -3552,7 +3552,7 @@
         </p:nvSpPr>
         <p:spPr>
           <a:xfrm flipH="1">
-            <a:off x="3711145" y="3288957"/>
+            <a:off x="3711145" y="4644081"/>
             <a:ext cx="1811345" cy="422960"/>
           </a:xfrm>
           <a:prstGeom prst="rect">
@@ -3612,7 +3612,7 @@
         </p:nvCxnSpPr>
         <p:spPr>
           <a:xfrm rot="5400000">
-            <a:off x="2712683" y="1382763"/>
+            <a:off x="2712683" y="2737887"/>
             <a:ext cx="1147939" cy="2660330"/>
           </a:xfrm>
           <a:prstGeom prst="bentConnector3">
@@ -3653,7 +3653,7 @@
         </p:nvSpPr>
         <p:spPr>
           <a:xfrm rot="10800000" flipV="1">
-            <a:off x="4481565" y="1963436"/>
+            <a:off x="4481565" y="3318560"/>
             <a:ext cx="270504" cy="175523"/>
           </a:xfrm>
           <a:prstGeom prst="triangle">
@@ -3709,7 +3709,7 @@
         </p:nvSpPr>
         <p:spPr>
           <a:xfrm flipH="1">
-            <a:off x="965887" y="3286898"/>
+            <a:off x="965887" y="4642022"/>
             <a:ext cx="1981200" cy="422960"/>
           </a:xfrm>
           <a:prstGeom prst="rect">
@@ -3766,7 +3766,7 @@
         </p:nvSpPr>
         <p:spPr>
           <a:xfrm flipH="1">
-            <a:off x="6286548" y="3286898"/>
+            <a:off x="6286548" y="4642022"/>
             <a:ext cx="2145469" cy="422960"/>
           </a:xfrm>
           <a:prstGeom prst="rect">
@@ -3823,7 +3823,7 @@
         </p:nvCxnSpPr>
         <p:spPr>
           <a:xfrm>
-            <a:off x="4617280" y="2709116"/>
+            <a:off x="4617280" y="4064240"/>
             <a:ext cx="0" cy="576030"/>
           </a:xfrm>
           <a:prstGeom prst="line">
@@ -3854,35 +3854,36 @@
       </p:cxnSp>
       <p:sp>
         <p:nvSpPr>
-          <p:cNvPr id="10" name="Rectangle 11"/>
+          <p:cNvPr id="11" name="Rectangle 62"/>
           <p:cNvSpPr/>
           <p:nvPr/>
         </p:nvSpPr>
         <p:spPr>
-          <a:xfrm flipH="1">
-            <a:off x="3711145" y="3286898"/>
-            <a:ext cx="1811345" cy="422960"/>
+          <a:xfrm>
+            <a:off x="3772931" y="1688541"/>
+            <a:ext cx="1688268" cy="422960"/>
           </a:xfrm>
           <a:prstGeom prst="rect">
             <a:avLst/>
           </a:prstGeom>
           <a:ln w="19050">
             <a:solidFill>
-              <a:schemeClr val="accent5">
-                <a:lumMod val="75000"/>
+              <a:schemeClr val="tx1">
+                <a:lumMod val="85000"/>
+                <a:lumOff val="15000"/>
               </a:schemeClr>
             </a:solidFill>
           </a:ln>
         </p:spPr>
         <p:style>
           <a:lnRef idx="1">
-            <a:schemeClr val="accent5"/>
+            <a:schemeClr val="dk1"/>
           </a:lnRef>
           <a:fillRef idx="2">
-            <a:schemeClr val="accent5"/>
+            <a:schemeClr val="dk1"/>
           </a:fillRef>
           <a:effectRef idx="1">
-            <a:schemeClr val="accent5"/>
+            <a:schemeClr val="dk1"/>
           </a:effectRef>
           <a:fontRef idx="minor">
             <a:schemeClr val="dk1"/>
@@ -3894,16 +3895,118 @@
           <a:p>
             <a:pPr algn="ctr"/>
             <a:r>
-              <a:rPr lang="en-US" sz="1050" b="1" dirty="0" err="1" smtClean="0">
+              <a:rPr lang="en-US" sz="1050" b="1" dirty="0" smtClean="0">
                 <a:solidFill>
-                  <a:srgbClr val="0070C0"/>
+                  <a:schemeClr val="tx1">
+                    <a:lumMod val="85000"/>
+                    <a:lumOff val="15000"/>
+                  </a:schemeClr>
                 </a:solidFill>
               </a:rPr>
-              <a:t>InvalidFileNameException</a:t>
-            </a:r>
-            <a:endParaRPr lang="en-US" sz="1050" b="1" dirty="0">
+              <a:t>Exception</a:t>
+            </a:r>
+            <a:endParaRPr lang="en-SG" sz="1050" b="1" dirty="0">
               <a:solidFill>
-                <a:srgbClr val="0070C0"/>
+                <a:schemeClr val="tx1">
+                  <a:lumMod val="85000"/>
+                  <a:lumOff val="15000"/>
+                </a:schemeClr>
+              </a:solidFill>
+            </a:endParaRPr>
+          </a:p>
+        </p:txBody>
+      </p:sp>
+      <p:cxnSp>
+        <p:nvCxnSpPr>
+          <p:cNvPr id="14" name="Straight Connector 13"/>
+          <p:cNvCxnSpPr>
+            <a:stCxn id="11" idx="2"/>
+          </p:cNvCxnSpPr>
+          <p:nvPr/>
+        </p:nvCxnSpPr>
+        <p:spPr>
+          <a:xfrm flipH="1">
+            <a:off x="4616817" y="2111501"/>
+            <a:ext cx="248" cy="784099"/>
+          </a:xfrm>
+          <a:prstGeom prst="line">
+            <a:avLst/>
+          </a:prstGeom>
+          <a:ln w="19050">
+            <a:solidFill>
+              <a:schemeClr val="tx1">
+                <a:lumMod val="85000"/>
+                <a:lumOff val="15000"/>
+              </a:schemeClr>
+            </a:solidFill>
+          </a:ln>
+        </p:spPr>
+        <p:style>
+          <a:lnRef idx="1">
+            <a:schemeClr val="accent1"/>
+          </a:lnRef>
+          <a:fillRef idx="0">
+            <a:schemeClr val="accent1"/>
+          </a:fillRef>
+          <a:effectRef idx="0">
+            <a:schemeClr val="accent1"/>
+          </a:effectRef>
+          <a:fontRef idx="minor">
+            <a:schemeClr val="tx1"/>
+          </a:fontRef>
+        </p:style>
+      </p:cxnSp>
+      <p:sp>
+        <p:nvSpPr>
+          <p:cNvPr id="16" name="Isosceles Triangle 102"/>
+          <p:cNvSpPr/>
+          <p:nvPr/>
+        </p:nvSpPr>
+        <p:spPr>
+          <a:xfrm rot="10800000" flipV="1">
+            <a:off x="4481565" y="2133294"/>
+            <a:ext cx="270504" cy="175523"/>
+          </a:xfrm>
+          <a:prstGeom prst="triangle">
+            <a:avLst/>
+          </a:prstGeom>
+          <a:solidFill>
+            <a:schemeClr val="bg1">
+              <a:lumMod val="75000"/>
+            </a:schemeClr>
+          </a:solidFill>
+          <a:ln w="19050">
+            <a:solidFill>
+              <a:schemeClr val="tx1">
+                <a:lumMod val="85000"/>
+                <a:lumOff val="15000"/>
+              </a:schemeClr>
+            </a:solidFill>
+          </a:ln>
+          <a:effectLst/>
+        </p:spPr>
+        <p:style>
+          <a:lnRef idx="1">
+            <a:schemeClr val="accent1"/>
+          </a:lnRef>
+          <a:fillRef idx="2">
+            <a:schemeClr val="accent1"/>
+          </a:fillRef>
+          <a:effectRef idx="1">
+            <a:schemeClr val="accent1"/>
+          </a:effectRef>
+          <a:fontRef idx="minor">
+            <a:schemeClr val="dk1"/>
+          </a:fontRef>
+        </p:style>
+        <p:txBody>
+          <a:bodyPr rtlCol="0" anchor="ctr"/>
+          <a:lstStyle/>
+          <a:p>
+            <a:pPr algn="ctr"/>
+            <a:endParaRPr lang="en-SG" sz="1050" b="1">
+              <a:solidFill>
+                <a:srgbClr val="92D050"/>
               </a:solidFill>
             </a:endParaRPr>
           </a:p>

</xml_diff>